<commit_message>
add new presentation code
</commit_message>
<xml_diff>
--- a/Security/Content/Documents/Security.pptx
+++ b/Security/Content/Documents/Security.pptx
@@ -14,8 +14,10 @@
     <p:sldId id="259" r:id="rId8"/>
     <p:sldId id="264" r:id="rId9"/>
     <p:sldId id="261" r:id="rId10"/>
-    <p:sldId id="265" r:id="rId11"/>
-    <p:sldId id="266" r:id="rId12"/>
+    <p:sldId id="266" r:id="rId11"/>
+    <p:sldId id="267" r:id="rId12"/>
+    <p:sldId id="265" r:id="rId13"/>
+    <p:sldId id="268" r:id="rId14"/>
   </p:sldIdLst>
   <p:sldSz cx="9144000" cy="6858000" type="screen4x3"/>
   <p:notesSz cx="6858000" cy="9144000"/>
@@ -298,7 +300,7 @@
           <a:p>
             <a:fld id="{C5BCB02B-97BC-49AD-89C1-137F41ABB076}" type="datetimeFigureOut">
               <a:rPr lang="en-US" smtClean="0"/>
-              <a:t>6/24/2015</a:t>
+              <a:t>6/29/2015</a:t>
             </a:fld>
             <a:endParaRPr lang="en-US"/>
           </a:p>
@@ -468,7 +470,7 @@
           <a:p>
             <a:fld id="{C5BCB02B-97BC-49AD-89C1-137F41ABB076}" type="datetimeFigureOut">
               <a:rPr lang="en-US" smtClean="0"/>
-              <a:t>6/24/2015</a:t>
+              <a:t>6/29/2015</a:t>
             </a:fld>
             <a:endParaRPr lang="en-US"/>
           </a:p>
@@ -648,7 +650,7 @@
           <a:p>
             <a:fld id="{C5BCB02B-97BC-49AD-89C1-137F41ABB076}" type="datetimeFigureOut">
               <a:rPr lang="en-US" smtClean="0"/>
-              <a:t>6/24/2015</a:t>
+              <a:t>6/29/2015</a:t>
             </a:fld>
             <a:endParaRPr lang="en-US"/>
           </a:p>
@@ -818,7 +820,7 @@
           <a:p>
             <a:fld id="{C5BCB02B-97BC-49AD-89C1-137F41ABB076}" type="datetimeFigureOut">
               <a:rPr lang="en-US" smtClean="0"/>
-              <a:t>6/24/2015</a:t>
+              <a:t>6/29/2015</a:t>
             </a:fld>
             <a:endParaRPr lang="en-US"/>
           </a:p>
@@ -1064,7 +1066,7 @@
           <a:p>
             <a:fld id="{C5BCB02B-97BC-49AD-89C1-137F41ABB076}" type="datetimeFigureOut">
               <a:rPr lang="en-US" smtClean="0"/>
-              <a:t>6/24/2015</a:t>
+              <a:t>6/29/2015</a:t>
             </a:fld>
             <a:endParaRPr lang="en-US"/>
           </a:p>
@@ -1352,7 +1354,7 @@
           <a:p>
             <a:fld id="{C5BCB02B-97BC-49AD-89C1-137F41ABB076}" type="datetimeFigureOut">
               <a:rPr lang="en-US" smtClean="0"/>
-              <a:t>6/24/2015</a:t>
+              <a:t>6/29/2015</a:t>
             </a:fld>
             <a:endParaRPr lang="en-US"/>
           </a:p>
@@ -1774,7 +1776,7 @@
           <a:p>
             <a:fld id="{C5BCB02B-97BC-49AD-89C1-137F41ABB076}" type="datetimeFigureOut">
               <a:rPr lang="en-US" smtClean="0"/>
-              <a:t>6/24/2015</a:t>
+              <a:t>6/29/2015</a:t>
             </a:fld>
             <a:endParaRPr lang="en-US"/>
           </a:p>
@@ -1892,7 +1894,7 @@
           <a:p>
             <a:fld id="{C5BCB02B-97BC-49AD-89C1-137F41ABB076}" type="datetimeFigureOut">
               <a:rPr lang="en-US" smtClean="0"/>
-              <a:t>6/24/2015</a:t>
+              <a:t>6/29/2015</a:t>
             </a:fld>
             <a:endParaRPr lang="en-US"/>
           </a:p>
@@ -1987,7 +1989,7 @@
           <a:p>
             <a:fld id="{C5BCB02B-97BC-49AD-89C1-137F41ABB076}" type="datetimeFigureOut">
               <a:rPr lang="en-US" smtClean="0"/>
-              <a:t>6/24/2015</a:t>
+              <a:t>6/29/2015</a:t>
             </a:fld>
             <a:endParaRPr lang="en-US"/>
           </a:p>
@@ -2264,7 +2266,7 @@
           <a:p>
             <a:fld id="{C5BCB02B-97BC-49AD-89C1-137F41ABB076}" type="datetimeFigureOut">
               <a:rPr lang="en-US" smtClean="0"/>
-              <a:t>6/24/2015</a:t>
+              <a:t>6/29/2015</a:t>
             </a:fld>
             <a:endParaRPr lang="en-US"/>
           </a:p>
@@ -2517,7 +2519,7 @@
           <a:p>
             <a:fld id="{C5BCB02B-97BC-49AD-89C1-137F41ABB076}" type="datetimeFigureOut">
               <a:rPr lang="en-US" smtClean="0"/>
-              <a:t>6/24/2015</a:t>
+              <a:t>6/29/2015</a:t>
             </a:fld>
             <a:endParaRPr lang="en-US"/>
           </a:p>
@@ -2730,7 +2732,7 @@
           <a:p>
             <a:fld id="{C5BCB02B-97BC-49AD-89C1-137F41ABB076}" type="datetimeFigureOut">
               <a:rPr lang="en-US" smtClean="0"/>
-              <a:t>6/24/2015</a:t>
+              <a:t>6/29/2015</a:t>
             </a:fld>
             <a:endParaRPr lang="en-US"/>
           </a:p>
@@ -3258,7 +3260,7 @@
           <a:p>
             <a:r>
               <a:rPr lang="en-US" dirty="0" smtClean="0"/>
-              <a:t>General Best Practices</a:t>
+              <a:t>Cross Site Request Forgery</a:t>
             </a:r>
             <a:endParaRPr lang="en-US" dirty="0"/>
           </a:p>
@@ -3281,38 +3283,52 @@
           <a:p>
             <a:r>
               <a:rPr lang="en-US" dirty="0" smtClean="0"/>
-              <a:t>Don’t give away information - “Your password is invalid” or “username not found”</a:t>
-            </a:r>
+              <a:t>When a </a:t>
+            </a:r>
+            <a:r>
+              <a:rPr lang="en-US" dirty="0"/>
+              <a:t>program causes a user's Web browser to perform an unwanted action on a trusted </a:t>
+            </a:r>
+            <a:r>
+              <a:rPr lang="en-US" b="1" dirty="0"/>
+              <a:t>site</a:t>
+            </a:r>
+            <a:r>
+              <a:rPr lang="en-US" dirty="0"/>
+              <a:t> for which the user is currently authenticated</a:t>
+            </a:r>
+            <a:endParaRPr lang="en-US" dirty="0" smtClean="0"/>
           </a:p>
           <a:p>
             <a:r>
               <a:rPr lang="en-US" dirty="0" smtClean="0"/>
-              <a:t>Don’t be predictable - admin/admin</a:t>
-            </a:r>
+              <a:t>HTTP </a:t>
+            </a:r>
+            <a:r>
+              <a:rPr lang="en-US" dirty="0" err="1" smtClean="0"/>
+              <a:t>referer</a:t>
+            </a:r>
+            <a:endParaRPr lang="en-US" dirty="0" smtClean="0"/>
           </a:p>
           <a:p>
             <a:r>
               <a:rPr lang="en-US" dirty="0" smtClean="0"/>
-              <a:t>Always change default creds – </a:t>
-            </a:r>
-            <a:r>
-              <a:rPr lang="en-US" dirty="0" err="1" smtClean="0"/>
-              <a:t>sa</a:t>
-            </a:r>
+              <a:t>CAPTCHA</a:t>
+            </a:r>
+          </a:p>
+          <a:p>
             <a:r>
               <a:rPr lang="en-US" dirty="0" smtClean="0"/>
-              <a:t>/””</a:t>
-            </a:r>
-          </a:p>
-          <a:p>
-            <a:endParaRPr lang="en-US" dirty="0"/>
+              <a:t>Re-Authentication (Like amazon.com)</a:t>
+            </a:r>
+            <a:endParaRPr lang="en-US" dirty="0" smtClean="0"/>
           </a:p>
         </p:txBody>
       </p:sp>
     </p:spTree>
     <p:extLst>
       <p:ext uri="{BB962C8B-B14F-4D97-AF65-F5344CB8AC3E}">
-        <p14:creationId xmlns:p14="http://schemas.microsoft.com/office/powerpoint/2010/main" val="2407966952"/>
+        <p14:creationId xmlns:p14="http://schemas.microsoft.com/office/powerpoint/2010/main" val="1874201289"/>
       </p:ext>
     </p:extLst>
   </p:cSld>
@@ -3356,7 +3372,7 @@
           <a:p>
             <a:r>
               <a:rPr lang="en-US" dirty="0" smtClean="0"/>
-              <a:t>Cross Site Request Forgery</a:t>
+              <a:t>Clickjacking</a:t>
             </a:r>
             <a:endParaRPr lang="en-US" dirty="0"/>
           </a:p>
@@ -3379,30 +3395,23 @@
           <a:p>
             <a:r>
               <a:rPr lang="en-US" dirty="0"/>
-              <a:t>HTTP </a:t>
-            </a:r>
-            <a:r>
-              <a:rPr lang="en-US" dirty="0" err="1" smtClean="0"/>
-              <a:t>referer</a:t>
-            </a:r>
-            <a:endParaRPr lang="en-US" dirty="0" smtClean="0"/>
-          </a:p>
-          <a:p>
+              <a:t>the malicious practice of manipulating a website user's activity by concealing hyperlinks beneath legitimate clickable content, thereby causing the user to perform actions of which they are </a:t>
+            </a:r>
             <a:r>
               <a:rPr lang="en-US" dirty="0" smtClean="0"/>
-              <a:t>CAPTCHA</a:t>
+              <a:t>unaware.</a:t>
             </a:r>
           </a:p>
           <a:p>
             <a:r>
               <a:rPr lang="en-US" dirty="0" smtClean="0"/>
-              <a:t>Re-Authentication</a:t>
+              <a:t>Lets see it!</a:t>
             </a:r>
           </a:p>
           <a:p>
             <a:r>
               <a:rPr lang="en-US" dirty="0" smtClean="0"/>
-              <a:t>Synchronizer Token Pattern</a:t>
+              <a:t>Lets prevent it!</a:t>
             </a:r>
             <a:endParaRPr lang="en-US" dirty="0"/>
           </a:p>
@@ -3411,7 +3420,181 @@
     </p:spTree>
     <p:extLst>
       <p:ext uri="{BB962C8B-B14F-4D97-AF65-F5344CB8AC3E}">
-        <p14:creationId xmlns:p14="http://schemas.microsoft.com/office/powerpoint/2010/main" val="1874201289"/>
+        <p14:creationId xmlns:p14="http://schemas.microsoft.com/office/powerpoint/2010/main" val="2796542559"/>
+      </p:ext>
+    </p:extLst>
+  </p:cSld>
+  <p:clrMapOvr>
+    <a:masterClrMapping/>
+  </p:clrMapOvr>
+</p:sld>
+</file>
+
+<file path=ppt/slides/slide12.xml><?xml version="1.0" encoding="utf-8"?>
+<p:sld xmlns:a="http://schemas.openxmlformats.org/drawingml/2006/main" xmlns:r="http://schemas.openxmlformats.org/officeDocument/2006/relationships" xmlns:p="http://schemas.openxmlformats.org/presentationml/2006/main">
+  <p:cSld>
+    <p:spTree>
+      <p:nvGrpSpPr>
+        <p:cNvPr id="1" name=""/>
+        <p:cNvGrpSpPr/>
+        <p:nvPr/>
+      </p:nvGrpSpPr>
+      <p:grpSpPr>
+        <a:xfrm>
+          <a:off x="0" y="0"/>
+          <a:ext cx="0" cy="0"/>
+          <a:chOff x="0" y="0"/>
+          <a:chExt cx="0" cy="0"/>
+        </a:xfrm>
+      </p:grpSpPr>
+      <p:sp>
+        <p:nvSpPr>
+          <p:cNvPr id="2" name="Title 1"/>
+          <p:cNvSpPr>
+            <a:spLocks noGrp="1"/>
+          </p:cNvSpPr>
+          <p:nvPr>
+            <p:ph type="title"/>
+          </p:nvPr>
+        </p:nvSpPr>
+        <p:spPr/>
+        <p:txBody>
+          <a:bodyPr/>
+          <a:lstStyle/>
+          <a:p>
+            <a:r>
+              <a:rPr lang="en-US" dirty="0" smtClean="0"/>
+              <a:t>General Best Practices</a:t>
+            </a:r>
+            <a:endParaRPr lang="en-US" dirty="0"/>
+          </a:p>
+        </p:txBody>
+      </p:sp>
+      <p:sp>
+        <p:nvSpPr>
+          <p:cNvPr id="3" name="Content Placeholder 2"/>
+          <p:cNvSpPr>
+            <a:spLocks noGrp="1"/>
+          </p:cNvSpPr>
+          <p:nvPr>
+            <p:ph idx="1"/>
+          </p:nvPr>
+        </p:nvSpPr>
+        <p:spPr/>
+        <p:txBody>
+          <a:bodyPr/>
+          <a:lstStyle/>
+          <a:p>
+            <a:r>
+              <a:rPr lang="en-US" dirty="0" smtClean="0"/>
+              <a:t>Don’t give away information - “Your password is invalid” or “username not found”</a:t>
+            </a:r>
+          </a:p>
+          <a:p>
+            <a:r>
+              <a:rPr lang="en-US" dirty="0" smtClean="0"/>
+              <a:t>Don’t be predictable - admin/admin</a:t>
+            </a:r>
+          </a:p>
+          <a:p>
+            <a:r>
+              <a:rPr lang="en-US" dirty="0" smtClean="0"/>
+              <a:t>Always change default creds – </a:t>
+            </a:r>
+            <a:r>
+              <a:rPr lang="en-US" dirty="0" err="1" smtClean="0"/>
+              <a:t>sa</a:t>
+            </a:r>
+            <a:r>
+              <a:rPr lang="en-US" dirty="0" smtClean="0"/>
+              <a:t>/””</a:t>
+            </a:r>
+          </a:p>
+          <a:p>
+            <a:endParaRPr lang="en-US" dirty="0"/>
+          </a:p>
+        </p:txBody>
+      </p:sp>
+    </p:spTree>
+    <p:extLst>
+      <p:ext uri="{BB962C8B-B14F-4D97-AF65-F5344CB8AC3E}">
+        <p14:creationId xmlns:p14="http://schemas.microsoft.com/office/powerpoint/2010/main" val="2407966952"/>
+      </p:ext>
+    </p:extLst>
+  </p:cSld>
+  <p:clrMapOvr>
+    <a:masterClrMapping/>
+  </p:clrMapOvr>
+</p:sld>
+</file>
+
+<file path=ppt/slides/slide13.xml><?xml version="1.0" encoding="utf-8"?>
+<p:sld xmlns:a="http://schemas.openxmlformats.org/drawingml/2006/main" xmlns:r="http://schemas.openxmlformats.org/officeDocument/2006/relationships" xmlns:p="http://schemas.openxmlformats.org/presentationml/2006/main">
+  <p:cSld>
+    <p:spTree>
+      <p:nvGrpSpPr>
+        <p:cNvPr id="1" name=""/>
+        <p:cNvGrpSpPr/>
+        <p:nvPr/>
+      </p:nvGrpSpPr>
+      <p:grpSpPr>
+        <a:xfrm>
+          <a:off x="0" y="0"/>
+          <a:ext cx="0" cy="0"/>
+          <a:chOff x="0" y="0"/>
+          <a:chExt cx="0" cy="0"/>
+        </a:xfrm>
+      </p:grpSpPr>
+      <p:sp>
+        <p:nvSpPr>
+          <p:cNvPr id="2" name="Title 1"/>
+          <p:cNvSpPr>
+            <a:spLocks noGrp="1"/>
+          </p:cNvSpPr>
+          <p:nvPr>
+            <p:ph type="title"/>
+          </p:nvPr>
+        </p:nvSpPr>
+        <p:spPr/>
+        <p:txBody>
+          <a:bodyPr/>
+          <a:lstStyle/>
+          <a:p>
+            <a:r>
+              <a:rPr lang="en-US" dirty="0" smtClean="0"/>
+              <a:t>OWASP</a:t>
+            </a:r>
+            <a:endParaRPr lang="en-US" dirty="0"/>
+          </a:p>
+        </p:txBody>
+      </p:sp>
+      <p:sp>
+        <p:nvSpPr>
+          <p:cNvPr id="3" name="Content Placeholder 2"/>
+          <p:cNvSpPr>
+            <a:spLocks noGrp="1"/>
+          </p:cNvSpPr>
+          <p:nvPr>
+            <p:ph idx="1"/>
+          </p:nvPr>
+        </p:nvSpPr>
+        <p:spPr/>
+        <p:txBody>
+          <a:bodyPr/>
+          <a:lstStyle/>
+          <a:p>
+            <a:r>
+              <a:rPr lang="en-US"/>
+              <a:t>The Open Web Application Security Project</a:t>
+            </a:r>
+            <a:endParaRPr lang="en-US"/>
+          </a:p>
+        </p:txBody>
+      </p:sp>
+    </p:spTree>
+    <p:extLst>
+      <p:ext uri="{BB962C8B-B14F-4D97-AF65-F5344CB8AC3E}">
+        <p14:creationId xmlns:p14="http://schemas.microsoft.com/office/powerpoint/2010/main" val="2339420415"/>
       </p:ext>
     </p:extLst>
   </p:cSld>
@@ -3610,7 +3793,17 @@
           <a:p>
             <a:r>
               <a:rPr lang="en-US" b="1" dirty="0" smtClean="0"/>
-              <a:t>Federal Government – 4 million employees</a:t>
+              <a:t>Federal Government – 4 million </a:t>
+            </a:r>
+            <a:r>
+              <a:rPr lang="en-US" b="1" dirty="0" smtClean="0"/>
+              <a:t>employees</a:t>
+            </a:r>
+          </a:p>
+          <a:p>
+            <a:r>
+              <a:rPr lang="en-US" b="1" dirty="0" smtClean="0"/>
+              <a:t>Utah – 280,000 SSNs</a:t>
             </a:r>
             <a:endParaRPr lang="en-US" dirty="0"/>
           </a:p>

</xml_diff>

<commit_message>
adding more presentation changes.
</commit_message>
<xml_diff>
--- a/Security/Content/Documents/Security.pptx
+++ b/Security/Content/Documents/Security.pptx
@@ -11,14 +11,17 @@
     <p:sldId id="260" r:id="rId5"/>
     <p:sldId id="262" r:id="rId6"/>
     <p:sldId id="263" r:id="rId7"/>
-    <p:sldId id="259" r:id="rId8"/>
-    <p:sldId id="264" r:id="rId9"/>
-    <p:sldId id="261" r:id="rId10"/>
-    <p:sldId id="266" r:id="rId11"/>
-    <p:sldId id="267" r:id="rId12"/>
-    <p:sldId id="265" r:id="rId13"/>
-    <p:sldId id="268" r:id="rId14"/>
-    <p:sldId id="269" r:id="rId15"/>
+    <p:sldId id="268" r:id="rId8"/>
+    <p:sldId id="259" r:id="rId9"/>
+    <p:sldId id="272" r:id="rId10"/>
+    <p:sldId id="264" r:id="rId11"/>
+    <p:sldId id="261" r:id="rId12"/>
+    <p:sldId id="270" r:id="rId13"/>
+    <p:sldId id="266" r:id="rId14"/>
+    <p:sldId id="267" r:id="rId15"/>
+    <p:sldId id="265" r:id="rId16"/>
+    <p:sldId id="269" r:id="rId17"/>
+    <p:sldId id="271" r:id="rId18"/>
   </p:sldIdLst>
   <p:sldSz cx="9144000" cy="6858000" type="screen4x3"/>
   <p:notesSz cx="6858000" cy="9144000"/>
@@ -301,7 +304,7 @@
           <a:p>
             <a:fld id="{C5BCB02B-97BC-49AD-89C1-137F41ABB076}" type="datetimeFigureOut">
               <a:rPr lang="en-US" smtClean="0"/>
-              <a:t>6/29/2015</a:t>
+              <a:t>6/30/2015</a:t>
             </a:fld>
             <a:endParaRPr lang="en-US"/>
           </a:p>
@@ -471,7 +474,7 @@
           <a:p>
             <a:fld id="{C5BCB02B-97BC-49AD-89C1-137F41ABB076}" type="datetimeFigureOut">
               <a:rPr lang="en-US" smtClean="0"/>
-              <a:t>6/29/2015</a:t>
+              <a:t>6/30/2015</a:t>
             </a:fld>
             <a:endParaRPr lang="en-US"/>
           </a:p>
@@ -651,7 +654,7 @@
           <a:p>
             <a:fld id="{C5BCB02B-97BC-49AD-89C1-137F41ABB076}" type="datetimeFigureOut">
               <a:rPr lang="en-US" smtClean="0"/>
-              <a:t>6/29/2015</a:t>
+              <a:t>6/30/2015</a:t>
             </a:fld>
             <a:endParaRPr lang="en-US"/>
           </a:p>
@@ -821,7 +824,7 @@
           <a:p>
             <a:fld id="{C5BCB02B-97BC-49AD-89C1-137F41ABB076}" type="datetimeFigureOut">
               <a:rPr lang="en-US" smtClean="0"/>
-              <a:t>6/29/2015</a:t>
+              <a:t>6/30/2015</a:t>
             </a:fld>
             <a:endParaRPr lang="en-US"/>
           </a:p>
@@ -1067,7 +1070,7 @@
           <a:p>
             <a:fld id="{C5BCB02B-97BC-49AD-89C1-137F41ABB076}" type="datetimeFigureOut">
               <a:rPr lang="en-US" smtClean="0"/>
-              <a:t>6/29/2015</a:t>
+              <a:t>6/30/2015</a:t>
             </a:fld>
             <a:endParaRPr lang="en-US"/>
           </a:p>
@@ -1355,7 +1358,7 @@
           <a:p>
             <a:fld id="{C5BCB02B-97BC-49AD-89C1-137F41ABB076}" type="datetimeFigureOut">
               <a:rPr lang="en-US" smtClean="0"/>
-              <a:t>6/29/2015</a:t>
+              <a:t>6/30/2015</a:t>
             </a:fld>
             <a:endParaRPr lang="en-US"/>
           </a:p>
@@ -1777,7 +1780,7 @@
           <a:p>
             <a:fld id="{C5BCB02B-97BC-49AD-89C1-137F41ABB076}" type="datetimeFigureOut">
               <a:rPr lang="en-US" smtClean="0"/>
-              <a:t>6/29/2015</a:t>
+              <a:t>6/30/2015</a:t>
             </a:fld>
             <a:endParaRPr lang="en-US"/>
           </a:p>
@@ -1895,7 +1898,7 @@
           <a:p>
             <a:fld id="{C5BCB02B-97BC-49AD-89C1-137F41ABB076}" type="datetimeFigureOut">
               <a:rPr lang="en-US" smtClean="0"/>
-              <a:t>6/29/2015</a:t>
+              <a:t>6/30/2015</a:t>
             </a:fld>
             <a:endParaRPr lang="en-US"/>
           </a:p>
@@ -1990,7 +1993,7 @@
           <a:p>
             <a:fld id="{C5BCB02B-97BC-49AD-89C1-137F41ABB076}" type="datetimeFigureOut">
               <a:rPr lang="en-US" smtClean="0"/>
-              <a:t>6/29/2015</a:t>
+              <a:t>6/30/2015</a:t>
             </a:fld>
             <a:endParaRPr lang="en-US"/>
           </a:p>
@@ -2267,7 +2270,7 @@
           <a:p>
             <a:fld id="{C5BCB02B-97BC-49AD-89C1-137F41ABB076}" type="datetimeFigureOut">
               <a:rPr lang="en-US" smtClean="0"/>
-              <a:t>6/29/2015</a:t>
+              <a:t>6/30/2015</a:t>
             </a:fld>
             <a:endParaRPr lang="en-US"/>
           </a:p>
@@ -2520,7 +2523,7 @@
           <a:p>
             <a:fld id="{C5BCB02B-97BC-49AD-89C1-137F41ABB076}" type="datetimeFigureOut">
               <a:rPr lang="en-US" smtClean="0"/>
-              <a:t>6/29/2015</a:t>
+              <a:t>6/30/2015</a:t>
             </a:fld>
             <a:endParaRPr lang="en-US"/>
           </a:p>
@@ -2733,7 +2736,7 @@
           <a:p>
             <a:fld id="{C5BCB02B-97BC-49AD-89C1-137F41ABB076}" type="datetimeFigureOut">
               <a:rPr lang="en-US" smtClean="0"/>
-              <a:t>6/29/2015</a:t>
+              <a:t>6/30/2015</a:t>
             </a:fld>
             <a:endParaRPr lang="en-US"/>
           </a:p>
@@ -3261,7 +3264,7 @@
           <a:p>
             <a:r>
               <a:rPr lang="en-US" dirty="0" smtClean="0"/>
-              <a:t>Cross Site Request Forgery</a:t>
+              <a:t>Cross Site Scripting (XSS)</a:t>
             </a:r>
             <a:endParaRPr lang="en-US" dirty="0"/>
           </a:p>
@@ -3284,43 +3287,45 @@
           <a:p>
             <a:r>
               <a:rPr lang="en-US" dirty="0" smtClean="0"/>
-              <a:t>When a </a:t>
-            </a:r>
-            <a:r>
-              <a:rPr lang="en-US" dirty="0"/>
-              <a:t>program causes a user's Web browser to perform an unwanted action on a trusted </a:t>
-            </a:r>
-            <a:r>
-              <a:rPr lang="en-US" b="1" dirty="0"/>
-              <a:t>site</a:t>
-            </a:r>
-            <a:r>
-              <a:rPr lang="en-US" dirty="0"/>
-              <a:t> for which the user is currently authenticated</a:t>
+              <a:t>XSS – Injecting client-side script into a site.</a:t>
+            </a:r>
+          </a:p>
+          <a:p>
+            <a:r>
+              <a:rPr lang="en-US" dirty="0" smtClean="0"/>
+              <a:t>Why is it dangerous? </a:t>
+            </a:r>
+            <a:endParaRPr lang="en-US" dirty="0"/>
+          </a:p>
+          <a:p>
+            <a:r>
+              <a:rPr lang="en-US" dirty="0" smtClean="0">
+                <a:hlinkClick r:id="rId2"/>
+              </a:rPr>
+              <a:t>http</a:t>
+            </a:r>
+            <a:r>
+              <a:rPr lang="en-US" dirty="0">
+                <a:hlinkClick r:id="rId2"/>
+              </a:rPr>
+              <a:t>://testfire.net</a:t>
+            </a:r>
+            <a:r>
+              <a:rPr lang="en-US" dirty="0" smtClean="0">
+                <a:hlinkClick r:id="rId2"/>
+              </a:rPr>
+              <a:t>/</a:t>
             </a:r>
             <a:endParaRPr lang="en-US" dirty="0" smtClean="0"/>
           </a:p>
           <a:p>
             <a:r>
               <a:rPr lang="en-US" dirty="0" smtClean="0"/>
-              <a:t>HTTP </a:t>
-            </a:r>
-            <a:r>
-              <a:rPr lang="en-US" dirty="0" err="1" smtClean="0"/>
-              <a:t>referer</a:t>
-            </a:r>
-            <a:endParaRPr lang="en-US" dirty="0" smtClean="0"/>
-          </a:p>
-          <a:p>
-            <a:r>
-              <a:rPr lang="en-US" dirty="0" smtClean="0"/>
-              <a:t>CAPTCHA</a:t>
-            </a:r>
-          </a:p>
-          <a:p>
-            <a:r>
-              <a:rPr lang="en-US" dirty="0" smtClean="0"/>
-              <a:t>Re-Authentication (Like amazon.com)</a:t>
+              <a:t>(see </a:t>
+            </a:r>
+            <a:r>
+              <a:rPr lang="en-US" smtClean="0"/>
+              <a:t>XSS/Attacks.txt)</a:t>
             </a:r>
             <a:endParaRPr lang="en-US" dirty="0" smtClean="0"/>
           </a:p>
@@ -3329,7 +3334,7 @@
     </p:spTree>
     <p:extLst>
       <p:ext uri="{BB962C8B-B14F-4D97-AF65-F5344CB8AC3E}">
-        <p14:creationId xmlns:p14="http://schemas.microsoft.com/office/powerpoint/2010/main" val="1874201289"/>
+        <p14:creationId xmlns:p14="http://schemas.microsoft.com/office/powerpoint/2010/main" val="886274846"/>
       </p:ext>
     </p:extLst>
   </p:cSld>
@@ -3373,7 +3378,7 @@
           <a:p>
             <a:r>
               <a:rPr lang="en-US" dirty="0" smtClean="0"/>
-              <a:t>Clickjacking</a:t>
+              <a:t>SQL Injection</a:t>
             </a:r>
             <a:endParaRPr lang="en-US" dirty="0"/>
           </a:p>
@@ -3395,33 +3400,35 @@
           <a:lstStyle/>
           <a:p>
             <a:r>
+              <a:rPr lang="en-US" dirty="0" smtClean="0"/>
+              <a:t>Inject SQL into a vulnerable site.</a:t>
+            </a:r>
+          </a:p>
+          <a:p>
+            <a:r>
+              <a:rPr lang="en-US" dirty="0" smtClean="0"/>
+              <a:t>Let’s hack </a:t>
+            </a:r>
+            <a:r>
               <a:rPr lang="en-US" dirty="0"/>
-              <a:t>the malicious practice of manipulating a website user's activity by concealing hyperlinks beneath legitimate clickable content, thereby causing the user to perform actions of which they are </a:t>
+              <a:t>something… </a:t>
             </a:r>
             <a:r>
               <a:rPr lang="en-US" dirty="0" smtClean="0"/>
-              <a:t>unaware.</a:t>
-            </a:r>
-          </a:p>
-          <a:p>
+              <a:t>[Demo</a:t>
+            </a:r>
             <a:r>
               <a:rPr lang="en-US" dirty="0" smtClean="0"/>
-              <a:t>Lets see it!</a:t>
-            </a:r>
-          </a:p>
-          <a:p>
-            <a:r>
-              <a:rPr lang="en-US" dirty="0" smtClean="0"/>
-              <a:t>Lets prevent it!</a:t>
-            </a:r>
-            <a:endParaRPr lang="en-US" dirty="0"/>
+              <a:t>]</a:t>
+            </a:r>
+            <a:endParaRPr lang="en-US" dirty="0" smtClean="0"/>
           </a:p>
         </p:txBody>
       </p:sp>
     </p:spTree>
     <p:extLst>
       <p:ext uri="{BB962C8B-B14F-4D97-AF65-F5344CB8AC3E}">
-        <p14:creationId xmlns:p14="http://schemas.microsoft.com/office/powerpoint/2010/main" val="2796542559"/>
+        <p14:creationId xmlns:p14="http://schemas.microsoft.com/office/powerpoint/2010/main" val="3759279647"/>
       </p:ext>
     </p:extLst>
   </p:cSld>
@@ -3465,7 +3472,7 @@
           <a:p>
             <a:r>
               <a:rPr lang="en-US" dirty="0" smtClean="0"/>
-              <a:t>General Best Practices</a:t>
+              <a:t>Defense!</a:t>
             </a:r>
             <a:endParaRPr lang="en-US" dirty="0"/>
           </a:p>
@@ -3488,38 +3495,57 @@
           <a:p>
             <a:r>
               <a:rPr lang="en-US" dirty="0" smtClean="0"/>
-              <a:t>Don’t give away information - “Your password is invalid” or “username not found”</a:t>
-            </a:r>
-          </a:p>
-          <a:p>
-            <a:r>
-              <a:rPr lang="en-US" dirty="0" smtClean="0"/>
-              <a:t>Don’t be predictable - admin/admin</a:t>
-            </a:r>
-          </a:p>
-          <a:p>
-            <a:r>
-              <a:rPr lang="en-US" dirty="0" smtClean="0"/>
-              <a:t>Always change default creds – </a:t>
-            </a:r>
-            <a:r>
-              <a:rPr lang="en-US" dirty="0" err="1" smtClean="0"/>
-              <a:t>sa</a:t>
-            </a:r>
-            <a:r>
-              <a:rPr lang="en-US" dirty="0" smtClean="0"/>
-              <a:t>/””</a:t>
-            </a:r>
-          </a:p>
-          <a:p>
+              <a:t>How can I defend against Injection?</a:t>
+            </a:r>
             <a:endParaRPr lang="en-US" dirty="0"/>
           </a:p>
         </p:txBody>
       </p:sp>
+      <p:pic>
+        <p:nvPicPr>
+          <p:cNvPr id="1026" name="Picture 2" descr="C:\Users\mabank\Downloads\walking-stick_defence_barton-wright_3.gif"/>
+          <p:cNvPicPr>
+            <a:picLocks noChangeAspect="1" noChangeArrowheads="1" noCrop="1"/>
+          </p:cNvPicPr>
+          <p:nvPr/>
+        </p:nvPicPr>
+        <p:blipFill>
+          <a:blip r:embed="rId2">
+            <a:extLst>
+              <a:ext uri="{28A0092B-C50C-407E-A947-70E740481C1C}">
+                <a14:useLocalDpi xmlns:a14="http://schemas.microsoft.com/office/drawing/2010/main" val="0"/>
+              </a:ext>
+            </a:extLst>
+          </a:blip>
+          <a:srcRect/>
+          <a:stretch>
+            <a:fillRect/>
+          </a:stretch>
+        </p:blipFill>
+        <p:spPr bwMode="auto">
+          <a:xfrm>
+            <a:off x="1752600" y="2362200"/>
+            <a:ext cx="4856163" cy="3704559"/>
+          </a:xfrm>
+          <a:prstGeom prst="rect">
+            <a:avLst/>
+          </a:prstGeom>
+          <a:noFill/>
+          <a:extLst>
+            <a:ext uri="{909E8E84-426E-40DD-AFC4-6F175D3DCCD1}">
+              <a14:hiddenFill xmlns:a14="http://schemas.microsoft.com/office/drawing/2010/main">
+                <a:solidFill>
+                  <a:srgbClr val="FFFFFF"/>
+                </a:solidFill>
+              </a14:hiddenFill>
+            </a:ext>
+          </a:extLst>
+        </p:spPr>
+      </p:pic>
     </p:spTree>
     <p:extLst>
       <p:ext uri="{BB962C8B-B14F-4D97-AF65-F5344CB8AC3E}">
-        <p14:creationId xmlns:p14="http://schemas.microsoft.com/office/powerpoint/2010/main" val="2407966952"/>
+        <p14:creationId xmlns:p14="http://schemas.microsoft.com/office/powerpoint/2010/main" val="1383150378"/>
       </p:ext>
     </p:extLst>
   </p:cSld>
@@ -3563,7 +3589,7 @@
           <a:p>
             <a:r>
               <a:rPr lang="en-US" dirty="0" smtClean="0"/>
-              <a:t>OWASP</a:t>
+              <a:t>Cross Site Request Forgery</a:t>
             </a:r>
             <a:endParaRPr lang="en-US" dirty="0"/>
           </a:p>
@@ -3585,49 +3611,52 @@
           <a:lstStyle/>
           <a:p>
             <a:r>
+              <a:rPr lang="en-US" dirty="0" smtClean="0"/>
+              <a:t>When a </a:t>
+            </a:r>
+            <a:r>
               <a:rPr lang="en-US" dirty="0"/>
-              <a:t>The Open Web Application Security </a:t>
-            </a:r>
+              <a:t>program causes a user's Web browser to perform an unwanted action on a trusted </a:t>
+            </a:r>
+            <a:r>
+              <a:rPr lang="en-US" b="1" dirty="0"/>
+              <a:t>site</a:t>
+            </a:r>
+            <a:r>
+              <a:rPr lang="en-US" dirty="0"/>
+              <a:t> for which the user is currently authenticated</a:t>
+            </a:r>
+            <a:endParaRPr lang="en-US" dirty="0" smtClean="0"/>
+          </a:p>
+          <a:p>
             <a:r>
               <a:rPr lang="en-US" dirty="0" smtClean="0"/>
-              <a:t>Project</a:t>
-            </a:r>
-          </a:p>
-          <a:p>
-            <a:r>
-              <a:rPr lang="en-US" dirty="0">
-                <a:hlinkClick r:id="rId2"/>
-              </a:rPr>
-              <a:t>https://</a:t>
-            </a:r>
-            <a:r>
-              <a:rPr lang="en-US" dirty="0" smtClean="0">
-                <a:hlinkClick r:id="rId2"/>
-              </a:rPr>
-              <a:t>www.owasp.org</a:t>
+              <a:t>HTTP </a:t>
+            </a:r>
+            <a:r>
+              <a:rPr lang="en-US" dirty="0" err="1" smtClean="0"/>
+              <a:t>referer</a:t>
             </a:r>
             <a:endParaRPr lang="en-US" dirty="0" smtClean="0"/>
           </a:p>
           <a:p>
             <a:r>
               <a:rPr lang="en-US" dirty="0" smtClean="0"/>
-              <a:t>Core Purpose - </a:t>
-            </a:r>
-            <a:r>
-              <a:rPr lang="en-US" dirty="0"/>
-              <a:t>Be the thriving global community that drives visibility and evolution in the safety and security of the world’s software.</a:t>
-            </a:r>
-            <a:endParaRPr lang="en-US" dirty="0" smtClean="0"/>
-          </a:p>
-          <a:p>
-            <a:endParaRPr lang="en-US" dirty="0"/>
+              <a:t>CAPTCHA</a:t>
+            </a:r>
+          </a:p>
+          <a:p>
+            <a:r>
+              <a:rPr lang="en-US" dirty="0" smtClean="0"/>
+              <a:t>Re-Authentication (Like amazon.com)</a:t>
+            </a:r>
           </a:p>
         </p:txBody>
       </p:sp>
     </p:spTree>
     <p:extLst>
       <p:ext uri="{BB962C8B-B14F-4D97-AF65-F5344CB8AC3E}">
-        <p14:creationId xmlns:p14="http://schemas.microsoft.com/office/powerpoint/2010/main" val="2339420415"/>
+        <p14:creationId xmlns:p14="http://schemas.microsoft.com/office/powerpoint/2010/main" val="1874201289"/>
       </p:ext>
     </p:extLst>
   </p:cSld>
@@ -3671,6 +3700,196 @@
           <a:p>
             <a:r>
               <a:rPr lang="en-US" dirty="0" smtClean="0"/>
+              <a:t>Clickjacking</a:t>
+            </a:r>
+            <a:endParaRPr lang="en-US" dirty="0"/>
+          </a:p>
+        </p:txBody>
+      </p:sp>
+      <p:sp>
+        <p:nvSpPr>
+          <p:cNvPr id="3" name="Content Placeholder 2"/>
+          <p:cNvSpPr>
+            <a:spLocks noGrp="1"/>
+          </p:cNvSpPr>
+          <p:nvPr>
+            <p:ph idx="1"/>
+          </p:nvPr>
+        </p:nvSpPr>
+        <p:spPr/>
+        <p:txBody>
+          <a:bodyPr/>
+          <a:lstStyle/>
+          <a:p>
+            <a:r>
+              <a:rPr lang="en-US" dirty="0"/>
+              <a:t>the malicious practice of manipulating a website user's activity by concealing hyperlinks beneath legitimate clickable content, thereby causing the user to perform actions of which they are </a:t>
+            </a:r>
+            <a:r>
+              <a:rPr lang="en-US" dirty="0" smtClean="0"/>
+              <a:t>unaware.</a:t>
+            </a:r>
+          </a:p>
+          <a:p>
+            <a:r>
+              <a:rPr lang="en-US" dirty="0" smtClean="0"/>
+              <a:t>Lets see it!</a:t>
+            </a:r>
+          </a:p>
+          <a:p>
+            <a:r>
+              <a:rPr lang="en-US" dirty="0" smtClean="0"/>
+              <a:t>Lets prevent it!</a:t>
+            </a:r>
+            <a:endParaRPr lang="en-US" dirty="0"/>
+          </a:p>
+        </p:txBody>
+      </p:sp>
+    </p:spTree>
+    <p:extLst>
+      <p:ext uri="{BB962C8B-B14F-4D97-AF65-F5344CB8AC3E}">
+        <p14:creationId xmlns:p14="http://schemas.microsoft.com/office/powerpoint/2010/main" val="2796542559"/>
+      </p:ext>
+    </p:extLst>
+  </p:cSld>
+  <p:clrMapOvr>
+    <a:masterClrMapping/>
+  </p:clrMapOvr>
+</p:sld>
+</file>
+
+<file path=ppt/slides/slide15.xml><?xml version="1.0" encoding="utf-8"?>
+<p:sld xmlns:a="http://schemas.openxmlformats.org/drawingml/2006/main" xmlns:r="http://schemas.openxmlformats.org/officeDocument/2006/relationships" xmlns:p="http://schemas.openxmlformats.org/presentationml/2006/main">
+  <p:cSld>
+    <p:spTree>
+      <p:nvGrpSpPr>
+        <p:cNvPr id="1" name=""/>
+        <p:cNvGrpSpPr/>
+        <p:nvPr/>
+      </p:nvGrpSpPr>
+      <p:grpSpPr>
+        <a:xfrm>
+          <a:off x="0" y="0"/>
+          <a:ext cx="0" cy="0"/>
+          <a:chOff x="0" y="0"/>
+          <a:chExt cx="0" cy="0"/>
+        </a:xfrm>
+      </p:grpSpPr>
+      <p:sp>
+        <p:nvSpPr>
+          <p:cNvPr id="2" name="Title 1"/>
+          <p:cNvSpPr>
+            <a:spLocks noGrp="1"/>
+          </p:cNvSpPr>
+          <p:nvPr>
+            <p:ph type="title"/>
+          </p:nvPr>
+        </p:nvSpPr>
+        <p:spPr/>
+        <p:txBody>
+          <a:bodyPr/>
+          <a:lstStyle/>
+          <a:p>
+            <a:r>
+              <a:rPr lang="en-US" dirty="0" smtClean="0"/>
+              <a:t>General Best Practices</a:t>
+            </a:r>
+            <a:endParaRPr lang="en-US" dirty="0"/>
+          </a:p>
+        </p:txBody>
+      </p:sp>
+      <p:sp>
+        <p:nvSpPr>
+          <p:cNvPr id="3" name="Content Placeholder 2"/>
+          <p:cNvSpPr>
+            <a:spLocks noGrp="1"/>
+          </p:cNvSpPr>
+          <p:nvPr>
+            <p:ph idx="1"/>
+          </p:nvPr>
+        </p:nvSpPr>
+        <p:spPr/>
+        <p:txBody>
+          <a:bodyPr/>
+          <a:lstStyle/>
+          <a:p>
+            <a:r>
+              <a:rPr lang="en-US" dirty="0" smtClean="0"/>
+              <a:t>Don’t give away information - “Your password is invalid” or “username not found”</a:t>
+            </a:r>
+          </a:p>
+          <a:p>
+            <a:r>
+              <a:rPr lang="en-US" dirty="0" smtClean="0"/>
+              <a:t>Don’t be predictable - admin/admin</a:t>
+            </a:r>
+          </a:p>
+          <a:p>
+            <a:r>
+              <a:rPr lang="en-US" dirty="0" smtClean="0"/>
+              <a:t>Always change default creds – </a:t>
+            </a:r>
+            <a:r>
+              <a:rPr lang="en-US" dirty="0" err="1" smtClean="0"/>
+              <a:t>sa</a:t>
+            </a:r>
+            <a:r>
+              <a:rPr lang="en-US" dirty="0" smtClean="0"/>
+              <a:t>/””</a:t>
+            </a:r>
+          </a:p>
+          <a:p>
+            <a:endParaRPr lang="en-US" dirty="0"/>
+          </a:p>
+        </p:txBody>
+      </p:sp>
+    </p:spTree>
+    <p:extLst>
+      <p:ext uri="{BB962C8B-B14F-4D97-AF65-F5344CB8AC3E}">
+        <p14:creationId xmlns:p14="http://schemas.microsoft.com/office/powerpoint/2010/main" val="2407966952"/>
+      </p:ext>
+    </p:extLst>
+  </p:cSld>
+  <p:clrMapOvr>
+    <a:masterClrMapping/>
+  </p:clrMapOvr>
+</p:sld>
+</file>
+
+<file path=ppt/slides/slide16.xml><?xml version="1.0" encoding="utf-8"?>
+<p:sld xmlns:a="http://schemas.openxmlformats.org/drawingml/2006/main" xmlns:r="http://schemas.openxmlformats.org/officeDocument/2006/relationships" xmlns:p="http://schemas.openxmlformats.org/presentationml/2006/main">
+  <p:cSld>
+    <p:spTree>
+      <p:nvGrpSpPr>
+        <p:cNvPr id="1" name=""/>
+        <p:cNvGrpSpPr/>
+        <p:nvPr/>
+      </p:nvGrpSpPr>
+      <p:grpSpPr>
+        <a:xfrm>
+          <a:off x="0" y="0"/>
+          <a:ext cx="0" cy="0"/>
+          <a:chOff x="0" y="0"/>
+          <a:chExt cx="0" cy="0"/>
+        </a:xfrm>
+      </p:grpSpPr>
+      <p:sp>
+        <p:nvSpPr>
+          <p:cNvPr id="2" name="Title 1"/>
+          <p:cNvSpPr>
+            <a:spLocks noGrp="1"/>
+          </p:cNvSpPr>
+          <p:nvPr>
+            <p:ph type="title"/>
+          </p:nvPr>
+        </p:nvSpPr>
+        <p:spPr/>
+        <p:txBody>
+          <a:bodyPr/>
+          <a:lstStyle/>
+          <a:p>
+            <a:r>
+              <a:rPr lang="en-US" dirty="0" smtClean="0"/>
               <a:t>Authentication</a:t>
             </a:r>
             <a:endParaRPr lang="en-US" dirty="0"/>
@@ -3700,6 +3919,178 @@
     <p:extLst>
       <p:ext uri="{BB962C8B-B14F-4D97-AF65-F5344CB8AC3E}">
         <p14:creationId xmlns:p14="http://schemas.microsoft.com/office/powerpoint/2010/main" val="3595273246"/>
+      </p:ext>
+    </p:extLst>
+  </p:cSld>
+  <p:clrMapOvr>
+    <a:masterClrMapping/>
+  </p:clrMapOvr>
+</p:sld>
+</file>
+
+<file path=ppt/slides/slide17.xml><?xml version="1.0" encoding="utf-8"?>
+<p:sld xmlns:a="http://schemas.openxmlformats.org/drawingml/2006/main" xmlns:r="http://schemas.openxmlformats.org/officeDocument/2006/relationships" xmlns:p="http://schemas.openxmlformats.org/presentationml/2006/main">
+  <p:cSld>
+    <p:spTree>
+      <p:nvGrpSpPr>
+        <p:cNvPr id="1" name=""/>
+        <p:cNvGrpSpPr/>
+        <p:nvPr/>
+      </p:nvGrpSpPr>
+      <p:grpSpPr>
+        <a:xfrm>
+          <a:off x="0" y="0"/>
+          <a:ext cx="0" cy="0"/>
+          <a:chOff x="0" y="0"/>
+          <a:chExt cx="0" cy="0"/>
+        </a:xfrm>
+      </p:grpSpPr>
+      <p:sp>
+        <p:nvSpPr>
+          <p:cNvPr id="2" name="Title 1"/>
+          <p:cNvSpPr>
+            <a:spLocks noGrp="1"/>
+          </p:cNvSpPr>
+          <p:nvPr>
+            <p:ph type="title"/>
+          </p:nvPr>
+        </p:nvSpPr>
+        <p:spPr/>
+        <p:txBody>
+          <a:bodyPr>
+            <a:normAutofit fontScale="90000"/>
+          </a:bodyPr>
+          <a:lstStyle/>
+          <a:p>
+            <a:r>
+              <a:rPr lang="en-US" dirty="0" smtClean="0"/>
+              <a:t>Presentation Guideline</a:t>
+            </a:r>
+            <a:br>
+              <a:rPr lang="en-US" dirty="0" smtClean="0"/>
+            </a:br>
+            <a:endParaRPr lang="en-US" dirty="0"/>
+          </a:p>
+        </p:txBody>
+      </p:sp>
+      <p:sp>
+        <p:nvSpPr>
+          <p:cNvPr id="3" name="Content Placeholder 2"/>
+          <p:cNvSpPr>
+            <a:spLocks noGrp="1"/>
+          </p:cNvSpPr>
+          <p:nvPr>
+            <p:ph idx="1"/>
+          </p:nvPr>
+        </p:nvSpPr>
+        <p:spPr/>
+        <p:txBody>
+          <a:bodyPr>
+            <a:normAutofit fontScale="70000" lnSpcReduction="20000"/>
+          </a:bodyPr>
+          <a:lstStyle/>
+          <a:p>
+            <a:r>
+              <a:rPr lang="en-US" dirty="0" smtClean="0"/>
+              <a:t>How </a:t>
+            </a:r>
+            <a:r>
+              <a:rPr lang="en-US" dirty="0"/>
+              <a:t>to mitigate against:</a:t>
+            </a:r>
+          </a:p>
+          <a:p>
+            <a:pPr lvl="1"/>
+            <a:r>
+              <a:rPr lang="en-US" dirty="0"/>
+              <a:t>SQL Injection</a:t>
+            </a:r>
+          </a:p>
+          <a:p>
+            <a:pPr lvl="1"/>
+            <a:r>
+              <a:rPr lang="en-US" dirty="0"/>
+              <a:t>Cross Site Request Forgery</a:t>
+            </a:r>
+          </a:p>
+          <a:p>
+            <a:pPr lvl="1"/>
+            <a:r>
+              <a:rPr lang="en-US" dirty="0"/>
+              <a:t>Cross Site Scripting</a:t>
+            </a:r>
+          </a:p>
+          <a:p>
+            <a:pPr lvl="1"/>
+            <a:r>
+              <a:rPr lang="en-US" dirty="0"/>
+              <a:t>Clickjacking</a:t>
+            </a:r>
+          </a:p>
+          <a:p>
+            <a:r>
+              <a:rPr lang="en-US" dirty="0"/>
+              <a:t>Authentication</a:t>
+            </a:r>
+          </a:p>
+          <a:p>
+            <a:pPr lvl="1"/>
+            <a:r>
+              <a:rPr lang="en-US" dirty="0"/>
+              <a:t>account lockout, password history/expiration, etc.</a:t>
+            </a:r>
+          </a:p>
+          <a:p>
+            <a:pPr lvl="1"/>
+            <a:r>
+              <a:rPr lang="en-US" dirty="0"/>
+              <a:t>Multi-factor authentication</a:t>
+            </a:r>
+          </a:p>
+          <a:p>
+            <a:pPr lvl="1"/>
+            <a:r>
+              <a:rPr lang="en-US" dirty="0"/>
+              <a:t>What is the correct way of storing passwords?</a:t>
+            </a:r>
+          </a:p>
+          <a:p>
+            <a:pPr lvl="1"/>
+            <a:r>
+              <a:rPr lang="en-US" dirty="0"/>
+              <a:t>Why should passwords be salted?</a:t>
+            </a:r>
+          </a:p>
+          <a:p>
+            <a:r>
+              <a:rPr lang="en-US" dirty="0"/>
+              <a:t>Input validation</a:t>
+            </a:r>
+          </a:p>
+          <a:p>
+            <a:r>
+              <a:rPr lang="en-US" dirty="0"/>
+              <a:t>PII/PHI (e.g. masking certain data in the UI)</a:t>
+            </a:r>
+          </a:p>
+          <a:p>
+            <a:r>
+              <a:rPr lang="en-US" dirty="0"/>
+              <a:t>What is OWASP?</a:t>
+            </a:r>
+          </a:p>
+          <a:p>
+            <a:r>
+              <a:rPr lang="en-US" dirty="0"/>
+              <a:t>How it relates to Javascript/.NET</a:t>
+            </a:r>
+          </a:p>
+        </p:txBody>
+      </p:sp>
+    </p:spTree>
+    <p:extLst>
+      <p:ext uri="{BB962C8B-B14F-4D97-AF65-F5344CB8AC3E}">
+        <p14:creationId xmlns:p14="http://schemas.microsoft.com/office/powerpoint/2010/main" val="1189173483"/>
       </p:ext>
     </p:extLst>
   </p:cSld>
@@ -3837,7 +4228,7 @@
           <a:p>
             <a:r>
               <a:rPr lang="en-US" dirty="0" smtClean="0"/>
-              <a:t>2015 Cyberattacks</a:t>
+              <a:t>Cyberattacks</a:t>
             </a:r>
             <a:endParaRPr lang="en-US" dirty="0"/>
           </a:p>
@@ -3855,62 +4246,46 @@
         </p:nvSpPr>
         <p:spPr/>
         <p:txBody>
-          <a:bodyPr/>
-          <a:lstStyle/>
-          <a:p>
-            <a:r>
-              <a:rPr lang="en-US" b="1" dirty="0" err="1"/>
-              <a:t>Primera</a:t>
-            </a:r>
-            <a:r>
-              <a:rPr lang="en-US" b="1" dirty="0"/>
-              <a:t> Blue </a:t>
-            </a:r>
-            <a:r>
-              <a:rPr lang="en-US" b="1" dirty="0" smtClean="0"/>
-              <a:t>Cross – 11 million customers </a:t>
-            </a:r>
-          </a:p>
-          <a:p>
-            <a:r>
-              <a:rPr lang="en-US" b="1" dirty="0" smtClean="0"/>
-              <a:t>Anthem - tens of millions customers</a:t>
-            </a:r>
-          </a:p>
-          <a:p>
-            <a:r>
-              <a:rPr lang="en-US" b="1" dirty="0" smtClean="0"/>
-              <a:t>Staples – 1.6 million credit cards</a:t>
-            </a:r>
-          </a:p>
-          <a:p>
-            <a:r>
-              <a:rPr lang="en-US" b="1" dirty="0" smtClean="0"/>
-              <a:t>Home Depot – 56 million credit cards</a:t>
-            </a:r>
-          </a:p>
-          <a:p>
-            <a:r>
-              <a:rPr lang="en-US" b="1" dirty="0" smtClean="0"/>
-              <a:t>JPMorgan chase – 83 million households</a:t>
-            </a:r>
-          </a:p>
-          <a:p>
-            <a:r>
-              <a:rPr lang="en-US" b="1" dirty="0" smtClean="0"/>
-              <a:t>Federal Government – 4 million </a:t>
-            </a:r>
-            <a:r>
-              <a:rPr lang="en-US" b="1" dirty="0" smtClean="0"/>
-              <a:t>employees</a:t>
-            </a:r>
-          </a:p>
-          <a:p>
-            <a:r>
-              <a:rPr lang="en-US" b="1" dirty="0" smtClean="0"/>
-              <a:t>Utah – 280,000 SSNs</a:t>
-            </a:r>
-            <a:endParaRPr lang="en-US" dirty="0"/>
+          <a:bodyPr>
+            <a:normAutofit/>
+          </a:bodyPr>
+          <a:lstStyle/>
+          <a:p>
+            <a:r>
+              <a:rPr lang="en-US" sz="2800" b="1" dirty="0" smtClean="0"/>
+              <a:t>$6 Billion Annually in healthcare alone</a:t>
+            </a:r>
+          </a:p>
+          <a:p>
+            <a:r>
+              <a:rPr lang="en-US" sz="2800" b="1" dirty="0" smtClean="0"/>
+              <a:t>Attacks agains</a:t>
+            </a:r>
+            <a:r>
+              <a:rPr lang="en-US" sz="2800" b="1" dirty="0" smtClean="0"/>
+              <a:t>t healthcare doubled in 5 years</a:t>
+            </a:r>
+          </a:p>
+          <a:p>
+            <a:r>
+              <a:rPr lang="en-US" sz="2800" b="1" dirty="0" smtClean="0"/>
+              <a:t>90% of providers hit with data breaches in past 2 years (source: </a:t>
+            </a:r>
+            <a:r>
+              <a:rPr lang="en-US" sz="2800" b="1" dirty="0" err="1" smtClean="0"/>
+              <a:t>bloomberg</a:t>
+            </a:r>
+            <a:r>
+              <a:rPr lang="en-US" sz="2800" b="1" dirty="0" smtClean="0"/>
+              <a:t>)</a:t>
+            </a:r>
+          </a:p>
+          <a:p>
+            <a:r>
+              <a:rPr lang="en-US" sz="2800" b="1" dirty="0" smtClean="0"/>
+              <a:t>2014 – FBI Warns healthcare is “lax” compared to other sectors</a:t>
+            </a:r>
+            <a:endParaRPr lang="en-US" sz="2800" b="1" dirty="0" smtClean="0"/>
           </a:p>
         </p:txBody>
       </p:sp>
@@ -4245,7 +4620,9 @@
         </p:nvSpPr>
         <p:spPr/>
         <p:txBody>
-          <a:bodyPr/>
+          <a:bodyPr>
+            <a:normAutofit lnSpcReduction="10000"/>
+          </a:bodyPr>
           <a:lstStyle/>
           <a:p>
             <a:r>
@@ -4300,21 +4677,36 @@
           <a:p>
             <a:r>
               <a:rPr lang="en-US" sz="2800" dirty="0" smtClean="0"/>
-              <a:t>Black Market Value $10.00: 10-20</a:t>
-            </a:r>
-            <a:r>
-              <a:rPr lang="en-US" sz="2800" dirty="0"/>
-              <a:t> </a:t>
+              <a:t>Black Market Value $</a:t>
             </a:r>
             <a:r>
               <a:rPr lang="en-US" sz="2800" dirty="0" smtClean="0"/>
-              <a:t>times that of PII.</a:t>
-            </a:r>
-          </a:p>
-          <a:p>
+              <a:t>10.00 - $20.00: 20-40 </a:t>
+            </a:r>
             <a:r>
               <a:rPr lang="en-US" sz="2800" dirty="0" smtClean="0"/>
-              <a:t>Why?  Drugs, Less secure, easier to obtain. </a:t>
+              <a:t>times that of PII</a:t>
+            </a:r>
+            <a:r>
+              <a:rPr lang="en-US" sz="2800" dirty="0" smtClean="0"/>
+              <a:t>.</a:t>
+            </a:r>
+          </a:p>
+          <a:p>
+            <a:r>
+              <a:rPr lang="en-US" sz="2800" dirty="0" err="1" smtClean="0"/>
+              <a:t>Fullz</a:t>
+            </a:r>
+            <a:r>
+              <a:rPr lang="en-US" sz="2800" dirty="0" smtClean="0"/>
+              <a:t> or Kitz PHI with fake documents $1,000+</a:t>
+            </a:r>
+            <a:endParaRPr lang="en-US" sz="2800" dirty="0" smtClean="0"/>
+          </a:p>
+          <a:p>
+            <a:r>
+              <a:rPr lang="en-US" sz="2800" dirty="0" smtClean="0"/>
+              <a:t>Why?  </a:t>
             </a:r>
             <a:endParaRPr lang="en-US" sz="2800" dirty="0"/>
           </a:p>
@@ -4367,7 +4759,7 @@
           <a:p>
             <a:r>
               <a:rPr lang="en-US" dirty="0" smtClean="0"/>
-              <a:t>Common attacks</a:t>
+              <a:t>OWASP</a:t>
             </a:r>
             <a:endParaRPr lang="en-US" dirty="0"/>
           </a:p>
@@ -4389,41 +4781,90 @@
           <a:lstStyle/>
           <a:p>
             <a:r>
+              <a:rPr lang="en-US" dirty="0"/>
+              <a:t>The Open Web Application Security </a:t>
+            </a:r>
+            <a:r>
               <a:rPr lang="en-US" dirty="0" smtClean="0"/>
-              <a:t>SQL Injection</a:t>
-            </a:r>
+              <a:t>Project</a:t>
+            </a:r>
+          </a:p>
+          <a:p>
+            <a:r>
+              <a:rPr lang="en-US" dirty="0">
+                <a:hlinkClick r:id="rId2"/>
+              </a:rPr>
+              <a:t>https://</a:t>
+            </a:r>
+            <a:r>
+              <a:rPr lang="en-US" dirty="0" smtClean="0">
+                <a:hlinkClick r:id="rId2"/>
+              </a:rPr>
+              <a:t>www.owasp.org</a:t>
+            </a:r>
+            <a:endParaRPr lang="en-US" dirty="0" smtClean="0"/>
           </a:p>
           <a:p>
             <a:r>
               <a:rPr lang="en-US" dirty="0" smtClean="0"/>
-              <a:t>Cross Site Scripting</a:t>
-            </a:r>
-          </a:p>
-          <a:p>
-            <a:r>
-              <a:rPr lang="en-US" dirty="0" smtClean="0"/>
-              <a:t>Cross Site Request Forgery</a:t>
-            </a:r>
-          </a:p>
-          <a:p>
-            <a:r>
-              <a:rPr lang="en-US" dirty="0" smtClean="0"/>
-              <a:t>Clickjacking</a:t>
-            </a:r>
-          </a:p>
-          <a:p>
-            <a:r>
-              <a:rPr lang="en-US" dirty="0" smtClean="0"/>
-              <a:t>Social Engineering</a:t>
-            </a:r>
+              <a:t>Core Purpose - </a:t>
+            </a:r>
+            <a:r>
+              <a:rPr lang="en-US" dirty="0"/>
+              <a:t>Be the thriving global community that drives visibility and evolution in the safety and security of the world’s software.</a:t>
+            </a:r>
+            <a:endParaRPr lang="en-US" dirty="0" smtClean="0"/>
+          </a:p>
+          <a:p>
             <a:endParaRPr lang="en-US" dirty="0"/>
           </a:p>
         </p:txBody>
       </p:sp>
+      <p:pic>
+        <p:nvPicPr>
+          <p:cNvPr id="2050" name="Picture 2" descr="C:\Users\mabank\Downloads\Owasp_logo_normal.jpg"/>
+          <p:cNvPicPr>
+            <a:picLocks noChangeAspect="1" noChangeArrowheads="1"/>
+          </p:cNvPicPr>
+          <p:nvPr/>
+        </p:nvPicPr>
+        <p:blipFill>
+          <a:blip r:embed="rId3">
+            <a:extLst>
+              <a:ext uri="{28A0092B-C50C-407E-A947-70E740481C1C}">
+                <a14:useLocalDpi xmlns:a14="http://schemas.microsoft.com/office/drawing/2010/main" val="0"/>
+              </a:ext>
+            </a:extLst>
+          </a:blip>
+          <a:srcRect/>
+          <a:stretch>
+            <a:fillRect/>
+          </a:stretch>
+        </p:blipFill>
+        <p:spPr bwMode="auto">
+          <a:xfrm>
+            <a:off x="1752600" y="93662"/>
+            <a:ext cx="1582737" cy="1582738"/>
+          </a:xfrm>
+          <a:prstGeom prst="rect">
+            <a:avLst/>
+          </a:prstGeom>
+          <a:noFill/>
+          <a:extLst>
+            <a:ext uri="{909E8E84-426E-40DD-AFC4-6F175D3DCCD1}">
+              <a14:hiddenFill xmlns:a14="http://schemas.microsoft.com/office/drawing/2010/main">
+                <a:solidFill>
+                  <a:srgbClr val="FFFFFF"/>
+                </a:solidFill>
+              </a14:hiddenFill>
+            </a:ext>
+          </a:extLst>
+        </p:spPr>
+      </p:pic>
     </p:spTree>
     <p:extLst>
       <p:ext uri="{BB962C8B-B14F-4D97-AF65-F5344CB8AC3E}">
-        <p14:creationId xmlns:p14="http://schemas.microsoft.com/office/powerpoint/2010/main" val="2949532798"/>
+        <p14:creationId xmlns:p14="http://schemas.microsoft.com/office/powerpoint/2010/main" val="2339420415"/>
       </p:ext>
     </p:extLst>
   </p:cSld>
@@ -4467,7 +4908,7 @@
           <a:p>
             <a:r>
               <a:rPr lang="en-US" dirty="0" smtClean="0"/>
-              <a:t>Cross Site Scripting (XSS)</a:t>
+              <a:t>Common attacks</a:t>
             </a:r>
             <a:endParaRPr lang="en-US" dirty="0"/>
           </a:p>
@@ -4485,33 +4926,82 @@
         </p:nvSpPr>
         <p:spPr/>
         <p:txBody>
-          <a:bodyPr/>
+          <a:bodyPr>
+            <a:normAutofit/>
+          </a:bodyPr>
           <a:lstStyle/>
           <a:p>
             <a:r>
               <a:rPr lang="en-US" dirty="0" smtClean="0"/>
-              <a:t>XSS – Injecting client-side script into a site.</a:t>
-            </a:r>
-          </a:p>
-          <a:p>
+              <a:t>SQL </a:t>
+            </a:r>
             <a:r>
               <a:rPr lang="en-US" dirty="0" smtClean="0"/>
-              <a:t>Why is it dangerous? [Demo]</a:t>
-            </a:r>
+              <a:t>Injection 1*</a:t>
+            </a:r>
+            <a:endParaRPr lang="en-US" dirty="0" smtClean="0"/>
           </a:p>
           <a:p>
             <a:r>
               <a:rPr lang="en-US" dirty="0" smtClean="0"/>
-              <a:t>How can I prevent it? [Code Review]</a:t>
-            </a:r>
+              <a:t>Cross Site </a:t>
+            </a:r>
+            <a:r>
+              <a:rPr lang="en-US" dirty="0" smtClean="0"/>
+              <a:t>Scripting 3*</a:t>
+            </a:r>
+            <a:endParaRPr lang="en-US" dirty="0" smtClean="0"/>
+          </a:p>
+          <a:p>
+            <a:r>
+              <a:rPr lang="en-US" dirty="0" smtClean="0"/>
+              <a:t>Cross Site Request </a:t>
+            </a:r>
+            <a:r>
+              <a:rPr lang="en-US" dirty="0" smtClean="0"/>
+              <a:t>Forgery 8*</a:t>
+            </a:r>
+            <a:endParaRPr lang="en-US" dirty="0" smtClean="0"/>
+          </a:p>
+          <a:p>
+            <a:r>
+              <a:rPr lang="en-US" dirty="0" smtClean="0"/>
+              <a:t>Clickjacking</a:t>
+            </a:r>
+          </a:p>
+          <a:p>
+            <a:r>
+              <a:rPr lang="en-US" dirty="0" smtClean="0"/>
+              <a:t>Social </a:t>
+            </a:r>
+            <a:r>
+              <a:rPr lang="en-US" dirty="0" smtClean="0"/>
+              <a:t>Engineering</a:t>
+            </a:r>
+          </a:p>
+          <a:p>
             <a:endParaRPr lang="en-US" dirty="0"/>
+          </a:p>
+          <a:p>
+            <a:r>
+              <a:rPr lang="en-US" sz="2000" dirty="0"/>
+              <a:t>https://www.owasp.org/index.php/Top_10_2013-Top_10</a:t>
+            </a:r>
+            <a:endParaRPr lang="en-US" sz="2000" dirty="0" smtClean="0"/>
+          </a:p>
+          <a:p>
+            <a:r>
+              <a:rPr lang="en-US" sz="2000" dirty="0" smtClean="0"/>
+              <a:t>*OWASP ranking 2013</a:t>
+            </a:r>
+            <a:endParaRPr lang="en-US" sz="2000" dirty="0"/>
           </a:p>
         </p:txBody>
       </p:sp>
     </p:spTree>
     <p:extLst>
       <p:ext uri="{BB962C8B-B14F-4D97-AF65-F5344CB8AC3E}">
-        <p14:creationId xmlns:p14="http://schemas.microsoft.com/office/powerpoint/2010/main" val="886274846"/>
+        <p14:creationId xmlns:p14="http://schemas.microsoft.com/office/powerpoint/2010/main" val="2949532798"/>
       </p:ext>
     </p:extLst>
   </p:cSld>
@@ -4550,12 +5040,14 @@
         </p:nvSpPr>
         <p:spPr/>
         <p:txBody>
-          <a:bodyPr/>
+          <a:bodyPr>
+            <a:normAutofit/>
+          </a:bodyPr>
           <a:lstStyle/>
           <a:p>
             <a:r>
               <a:rPr lang="en-US" dirty="0" smtClean="0"/>
-              <a:t>SQL Injection</a:t>
+              <a:t>Social Engineering</a:t>
             </a:r>
             <a:endParaRPr lang="en-US" dirty="0"/>
           </a:p>
@@ -4578,28 +5070,34 @@
           <a:p>
             <a:r>
               <a:rPr lang="en-US" dirty="0" smtClean="0"/>
-              <a:t>Inject SQL into a vulnerable site.</a:t>
-            </a:r>
-          </a:p>
-          <a:p>
-            <a:r>
-              <a:rPr lang="en-US" dirty="0" smtClean="0"/>
-              <a:t>Let’s hack </a:t>
-            </a:r>
+              <a:t>The weakest link in the Information Security Chain.</a:t>
+            </a:r>
+          </a:p>
+          <a:p>
             <a:r>
               <a:rPr lang="en-US" dirty="0"/>
-              <a:t>something… </a:t>
-            </a:r>
-            <a:r>
-              <a:rPr lang="en-US" dirty="0" smtClean="0"/>
-              <a:t>[Demo]</a:t>
-            </a:r>
-          </a:p>
-          <a:p>
-            <a:r>
-              <a:rPr lang="en-US" dirty="0" smtClean="0"/>
-              <a:t>How do I defend against it?  [Code Review]</a:t>
-            </a:r>
+              <a:t>Obviously, never give out confidential information.</a:t>
+            </a:r>
+          </a:p>
+          <a:p>
+            <a:r>
+              <a:rPr lang="en-US" dirty="0"/>
+              <a:t>Safeguard even inconsequential information about yourself.</a:t>
+            </a:r>
+          </a:p>
+          <a:p>
+            <a:r>
+              <a:rPr lang="en-US" dirty="0"/>
+              <a:t>Lie to security questions, and remember your lies. </a:t>
+            </a:r>
+          </a:p>
+          <a:p>
+            <a:pPr marL="0" indent="0">
+              <a:buNone/>
+            </a:pPr>
+            <a:endParaRPr lang="en-US" dirty="0" smtClean="0"/>
+          </a:p>
+          <a:p>
             <a:endParaRPr lang="en-US" dirty="0"/>
           </a:p>
         </p:txBody>
@@ -4607,7 +5105,7 @@
     </p:spTree>
     <p:extLst>
       <p:ext uri="{BB962C8B-B14F-4D97-AF65-F5344CB8AC3E}">
-        <p14:creationId xmlns:p14="http://schemas.microsoft.com/office/powerpoint/2010/main" val="3759279647"/>
+        <p14:creationId xmlns:p14="http://schemas.microsoft.com/office/powerpoint/2010/main" val="546520191"/>
       </p:ext>
     </p:extLst>
   </p:cSld>

</xml_diff>

<commit_message>
more additions for presentation
</commit_message>
<xml_diff>
--- a/Security/Content/Documents/Security.pptx
+++ b/Security/Content/Documents/Security.pptx
@@ -304,7 +304,7 @@
           <a:p>
             <a:fld id="{C5BCB02B-97BC-49AD-89C1-137F41ABB076}" type="datetimeFigureOut">
               <a:rPr lang="en-US" smtClean="0"/>
-              <a:t>6/30/2015</a:t>
+              <a:t>7/2/2015</a:t>
             </a:fld>
             <a:endParaRPr lang="en-US"/>
           </a:p>
@@ -474,7 +474,7 @@
           <a:p>
             <a:fld id="{C5BCB02B-97BC-49AD-89C1-137F41ABB076}" type="datetimeFigureOut">
               <a:rPr lang="en-US" smtClean="0"/>
-              <a:t>6/30/2015</a:t>
+              <a:t>7/2/2015</a:t>
             </a:fld>
             <a:endParaRPr lang="en-US"/>
           </a:p>
@@ -654,7 +654,7 @@
           <a:p>
             <a:fld id="{C5BCB02B-97BC-49AD-89C1-137F41ABB076}" type="datetimeFigureOut">
               <a:rPr lang="en-US" smtClean="0"/>
-              <a:t>6/30/2015</a:t>
+              <a:t>7/2/2015</a:t>
             </a:fld>
             <a:endParaRPr lang="en-US"/>
           </a:p>
@@ -824,7 +824,7 @@
           <a:p>
             <a:fld id="{C5BCB02B-97BC-49AD-89C1-137F41ABB076}" type="datetimeFigureOut">
               <a:rPr lang="en-US" smtClean="0"/>
-              <a:t>6/30/2015</a:t>
+              <a:t>7/2/2015</a:t>
             </a:fld>
             <a:endParaRPr lang="en-US"/>
           </a:p>
@@ -1070,7 +1070,7 @@
           <a:p>
             <a:fld id="{C5BCB02B-97BC-49AD-89C1-137F41ABB076}" type="datetimeFigureOut">
               <a:rPr lang="en-US" smtClean="0"/>
-              <a:t>6/30/2015</a:t>
+              <a:t>7/2/2015</a:t>
             </a:fld>
             <a:endParaRPr lang="en-US"/>
           </a:p>
@@ -1358,7 +1358,7 @@
           <a:p>
             <a:fld id="{C5BCB02B-97BC-49AD-89C1-137F41ABB076}" type="datetimeFigureOut">
               <a:rPr lang="en-US" smtClean="0"/>
-              <a:t>6/30/2015</a:t>
+              <a:t>7/2/2015</a:t>
             </a:fld>
             <a:endParaRPr lang="en-US"/>
           </a:p>
@@ -1780,7 +1780,7 @@
           <a:p>
             <a:fld id="{C5BCB02B-97BC-49AD-89C1-137F41ABB076}" type="datetimeFigureOut">
               <a:rPr lang="en-US" smtClean="0"/>
-              <a:t>6/30/2015</a:t>
+              <a:t>7/2/2015</a:t>
             </a:fld>
             <a:endParaRPr lang="en-US"/>
           </a:p>
@@ -1898,7 +1898,7 @@
           <a:p>
             <a:fld id="{C5BCB02B-97BC-49AD-89C1-137F41ABB076}" type="datetimeFigureOut">
               <a:rPr lang="en-US" smtClean="0"/>
-              <a:t>6/30/2015</a:t>
+              <a:t>7/2/2015</a:t>
             </a:fld>
             <a:endParaRPr lang="en-US"/>
           </a:p>
@@ -1993,7 +1993,7 @@
           <a:p>
             <a:fld id="{C5BCB02B-97BC-49AD-89C1-137F41ABB076}" type="datetimeFigureOut">
               <a:rPr lang="en-US" smtClean="0"/>
-              <a:t>6/30/2015</a:t>
+              <a:t>7/2/2015</a:t>
             </a:fld>
             <a:endParaRPr lang="en-US"/>
           </a:p>
@@ -2270,7 +2270,7 @@
           <a:p>
             <a:fld id="{C5BCB02B-97BC-49AD-89C1-137F41ABB076}" type="datetimeFigureOut">
               <a:rPr lang="en-US" smtClean="0"/>
-              <a:t>6/30/2015</a:t>
+              <a:t>7/2/2015</a:t>
             </a:fld>
             <a:endParaRPr lang="en-US"/>
           </a:p>
@@ -2523,7 +2523,7 @@
           <a:p>
             <a:fld id="{C5BCB02B-97BC-49AD-89C1-137F41ABB076}" type="datetimeFigureOut">
               <a:rPr lang="en-US" smtClean="0"/>
-              <a:t>6/30/2015</a:t>
+              <a:t>7/2/2015</a:t>
             </a:fld>
             <a:endParaRPr lang="en-US"/>
           </a:p>
@@ -2736,7 +2736,7 @@
           <a:p>
             <a:fld id="{C5BCB02B-97BC-49AD-89C1-137F41ABB076}" type="datetimeFigureOut">
               <a:rPr lang="en-US" smtClean="0"/>
-              <a:t>6/30/2015</a:t>
+              <a:t>7/2/2015</a:t>
             </a:fld>
             <a:endParaRPr lang="en-US"/>
           </a:p>
@@ -3410,13 +3410,8 @@
             </a:r>
             <a:r>
               <a:rPr lang="en-US" dirty="0" smtClean="0"/>
-              <a:t>[Demo</a:t>
-            </a:r>
-            <a:r>
-              <a:rPr lang="en-US" dirty="0" smtClean="0"/>
-              <a:t>]</a:t>
-            </a:r>
-            <a:endParaRPr lang="en-US" dirty="0" smtClean="0"/>
+              <a:t>[Demo]</a:t>
+            </a:r>
           </a:p>
         </p:txBody>
       </p:sp>
@@ -3639,7 +3634,6 @@
               <a:rPr lang="en-US" dirty="0" smtClean="0"/>
               <a:t>CAPTCHA - Anti-Pattern, bad for disabled users</a:t>
             </a:r>
-            <a:endParaRPr lang="en-US" dirty="0" smtClean="0"/>
           </a:p>
           <a:p>
             <a:r>
@@ -4255,11 +4249,7 @@
           <a:p>
             <a:r>
               <a:rPr lang="en-US" sz="2800" b="1" dirty="0" smtClean="0"/>
-              <a:t>Attacks agains</a:t>
-            </a:r>
-            <a:r>
-              <a:rPr lang="en-US" sz="2800" b="1" dirty="0" smtClean="0"/>
-              <a:t>t healthcare doubled in 5 years</a:t>
+              <a:t>Attacks against healthcare doubled in 5 years</a:t>
             </a:r>
           </a:p>
           <a:p>
@@ -4281,7 +4271,6 @@
               <a:rPr lang="en-US" sz="2800" b="1" dirty="0" smtClean="0"/>
               <a:t>2014 – FBI Warns healthcare is “lax” compared to other sectors</a:t>
             </a:r>
-            <a:endParaRPr lang="en-US" sz="2800" b="1" dirty="0" smtClean="0"/>
           </a:p>
         </p:txBody>
       </p:sp>
@@ -4673,19 +4662,7 @@
           <a:p>
             <a:r>
               <a:rPr lang="en-US" sz="2800" dirty="0" smtClean="0"/>
-              <a:t>Black Market Value $</a:t>
-            </a:r>
-            <a:r>
-              <a:rPr lang="en-US" sz="2800" dirty="0" smtClean="0"/>
-              <a:t>10.00 - $20.00: 20-40 </a:t>
-            </a:r>
-            <a:r>
-              <a:rPr lang="en-US" sz="2800" dirty="0" smtClean="0"/>
-              <a:t>times that of PII</a:t>
-            </a:r>
-            <a:r>
-              <a:rPr lang="en-US" sz="2800" dirty="0" smtClean="0"/>
-              <a:t>.</a:t>
+              <a:t>Black Market Value $10.00 - $20.00: 20-40 times that of PII.</a:t>
             </a:r>
           </a:p>
           <a:p>
@@ -4697,7 +4674,6 @@
               <a:rPr lang="en-US" sz="2800" dirty="0" smtClean="0"/>
               <a:t> or Kitz PHI with fake documents $1,000+</a:t>
             </a:r>
-            <a:endParaRPr lang="en-US" sz="2800" dirty="0" smtClean="0"/>
           </a:p>
           <a:p>
             <a:r>
@@ -4929,35 +4905,20 @@
           <a:p>
             <a:r>
               <a:rPr lang="en-US" dirty="0" smtClean="0"/>
-              <a:t>SQL </a:t>
-            </a:r>
+              <a:t>SQL Injection 1*</a:t>
+            </a:r>
+          </a:p>
+          <a:p>
             <a:r>
               <a:rPr lang="en-US" dirty="0" smtClean="0"/>
-              <a:t>Injection 1*</a:t>
-            </a:r>
-            <a:endParaRPr lang="en-US" dirty="0" smtClean="0"/>
+              <a:t>Cross Site Scripting 3*</a:t>
+            </a:r>
           </a:p>
           <a:p>
             <a:r>
               <a:rPr lang="en-US" dirty="0" smtClean="0"/>
-              <a:t>Cross Site </a:t>
-            </a:r>
-            <a:r>
-              <a:rPr lang="en-US" dirty="0" smtClean="0"/>
-              <a:t>Scripting 3*</a:t>
-            </a:r>
-            <a:endParaRPr lang="en-US" dirty="0" smtClean="0"/>
-          </a:p>
-          <a:p>
-            <a:r>
-              <a:rPr lang="en-US" dirty="0" smtClean="0"/>
-              <a:t>Cross Site Request </a:t>
-            </a:r>
-            <a:r>
-              <a:rPr lang="en-US" dirty="0" smtClean="0"/>
-              <a:t>Forgery 8*</a:t>
-            </a:r>
-            <a:endParaRPr lang="en-US" dirty="0" smtClean="0"/>
+              <a:t>Cross Site Request Forgery 8*</a:t>
+            </a:r>
           </a:p>
           <a:p>
             <a:r>
@@ -4968,11 +4929,7 @@
           <a:p>
             <a:r>
               <a:rPr lang="en-US" dirty="0" smtClean="0"/>
-              <a:t>Social </a:t>
-            </a:r>
-            <a:r>
-              <a:rPr lang="en-US" dirty="0" smtClean="0"/>
-              <a:t>Engineering</a:t>
+              <a:t>Social Engineering</a:t>
             </a:r>
           </a:p>
           <a:p>

</xml_diff>

<commit_message>
a few design tweaks and clean up
</commit_message>
<xml_diff>
--- a/Security/Content/Documents/Security.pptx
+++ b/Security/Content/Documents/Security.pptx
@@ -5,7 +5,7 @@
     <p:sldMasterId id="2147483648" r:id="rId1"/>
   </p:sldMasterIdLst>
   <p:notesMasterIdLst>
-    <p:notesMasterId r:id="rId19"/>
+    <p:notesMasterId r:id="rId20"/>
   </p:notesMasterIdLst>
   <p:sldIdLst>
     <p:sldId id="256" r:id="rId2"/>
@@ -24,7 +24,8 @@
     <p:sldId id="267" r:id="rId15"/>
     <p:sldId id="269" r:id="rId16"/>
     <p:sldId id="265" r:id="rId17"/>
-    <p:sldId id="271" r:id="rId18"/>
+    <p:sldId id="273" r:id="rId18"/>
+    <p:sldId id="271" r:id="rId19"/>
   </p:sldIdLst>
   <p:sldSz cx="9144000" cy="6858000" type="screen4x3"/>
   <p:notesSz cx="6858000" cy="9144000"/>
@@ -3578,9 +3579,51 @@
           </a:p>
         </p:txBody>
       </p:sp>
+      <p:sp>
+        <p:nvSpPr>
+          <p:cNvPr id="4" name="TextBox 3"/>
+          <p:cNvSpPr txBox="1"/>
+          <p:nvPr/>
+        </p:nvSpPr>
+        <p:spPr>
+          <a:xfrm>
+            <a:off x="2308663" y="4800600"/>
+            <a:ext cx="4701737" cy="1415772"/>
+          </a:xfrm>
+          <a:prstGeom prst="rect">
+            <a:avLst/>
+          </a:prstGeom>
+          <a:noFill/>
+        </p:spPr>
+        <p:txBody>
+          <a:bodyPr wrap="square" rtlCol="0">
+            <a:spAutoFit/>
+          </a:bodyPr>
+          <a:lstStyle/>
+          <a:p>
+            <a:pPr algn="ctr"/>
+            <a:r>
+              <a:rPr lang="en-US" sz="5400" dirty="0" smtClean="0"/>
+              <a:t>Security</a:t>
+            </a:r>
+            <a:r>
+              <a:rPr lang="en-US" sz="3200" dirty="0" smtClean="0"/>
+              <a:t/>
+            </a:r>
+            <a:br>
+              <a:rPr lang="en-US" sz="3200" dirty="0" smtClean="0"/>
+            </a:br>
+            <a:r>
+              <a:rPr lang="en-US" sz="3200" dirty="0" smtClean="0"/>
+              <a:t>The Internet and you.</a:t>
+            </a:r>
+            <a:endParaRPr lang="en-US" sz="3200" dirty="0"/>
+          </a:p>
+        </p:txBody>
+      </p:sp>
       <p:pic>
         <p:nvPicPr>
-          <p:cNvPr id="1026" name="Picture 2" descr="C:\Users\mabank\Downloads\bouncer_big.jpg"/>
+          <p:cNvPr id="3" name="Picture 2" descr="C:\Users\mabank\Downloads\anonymous.jpg"/>
           <p:cNvPicPr>
             <a:picLocks noChangeAspect="1" noChangeArrowheads="1"/>
           </p:cNvPicPr>
@@ -3601,8 +3644,8 @@
         </p:blipFill>
         <p:spPr bwMode="auto">
           <a:xfrm>
-            <a:off x="1295400" y="0"/>
-            <a:ext cx="6400800" cy="4610100"/>
+            <a:off x="914401" y="381000"/>
+            <a:ext cx="7315200" cy="4648200"/>
           </a:xfrm>
           <a:prstGeom prst="rect">
             <a:avLst/>
@@ -3619,48 +3662,6 @@
           </a:extLst>
         </p:spPr>
       </p:pic>
-      <p:sp>
-        <p:nvSpPr>
-          <p:cNvPr id="4" name="TextBox 3"/>
-          <p:cNvSpPr txBox="1"/>
-          <p:nvPr/>
-        </p:nvSpPr>
-        <p:spPr>
-          <a:xfrm>
-            <a:off x="2308663" y="4800600"/>
-            <a:ext cx="4701737" cy="1415772"/>
-          </a:xfrm>
-          <a:prstGeom prst="rect">
-            <a:avLst/>
-          </a:prstGeom>
-          <a:noFill/>
-        </p:spPr>
-        <p:txBody>
-          <a:bodyPr wrap="square" rtlCol="0">
-            <a:spAutoFit/>
-          </a:bodyPr>
-          <a:lstStyle/>
-          <a:p>
-            <a:pPr algn="ctr"/>
-            <a:r>
-              <a:rPr lang="en-US" sz="5400" dirty="0" smtClean="0"/>
-              <a:t>Security</a:t>
-            </a:r>
-            <a:r>
-              <a:rPr lang="en-US" sz="3200" dirty="0" smtClean="0"/>
-              <a:t/>
-            </a:r>
-            <a:br>
-              <a:rPr lang="en-US" sz="3200" dirty="0" smtClean="0"/>
-            </a:br>
-            <a:r>
-              <a:rPr lang="en-US" sz="3200" dirty="0" smtClean="0"/>
-              <a:t>The Internet and you.</a:t>
-            </a:r>
-            <a:endParaRPr lang="en-US" sz="3200" dirty="0"/>
-          </a:p>
-        </p:txBody>
-      </p:sp>
     </p:spTree>
     <p:extLst>
       <p:ext uri="{BB962C8B-B14F-4D97-AF65-F5344CB8AC3E}">
@@ -4655,6 +4656,88 @@
 </file>
 
 <file path=ppt/slides/slide17.xml><?xml version="1.0" encoding="utf-8"?>
+<p:sld xmlns:a="http://schemas.openxmlformats.org/drawingml/2006/main" xmlns:r="http://schemas.openxmlformats.org/officeDocument/2006/relationships" xmlns:p="http://schemas.openxmlformats.org/presentationml/2006/main">
+  <p:cSld>
+    <p:spTree>
+      <p:nvGrpSpPr>
+        <p:cNvPr id="1" name=""/>
+        <p:cNvGrpSpPr/>
+        <p:nvPr/>
+      </p:nvGrpSpPr>
+      <p:grpSpPr>
+        <a:xfrm>
+          <a:off x="0" y="0"/>
+          <a:ext cx="0" cy="0"/>
+          <a:chOff x="0" y="0"/>
+          <a:chExt cx="0" cy="0"/>
+        </a:xfrm>
+      </p:grpSpPr>
+      <p:sp>
+        <p:nvSpPr>
+          <p:cNvPr id="2" name="Title 1"/>
+          <p:cNvSpPr>
+            <a:spLocks noGrp="1"/>
+          </p:cNvSpPr>
+          <p:nvPr>
+            <p:ph type="title"/>
+          </p:nvPr>
+        </p:nvSpPr>
+        <p:spPr/>
+        <p:txBody>
+          <a:bodyPr/>
+          <a:lstStyle/>
+          <a:p>
+            <a:r>
+              <a:rPr lang="en-US" dirty="0" smtClean="0"/>
+              <a:t>Extra Credit - Was my site secure?</a:t>
+            </a:r>
+            <a:endParaRPr lang="en-US" dirty="0"/>
+          </a:p>
+        </p:txBody>
+      </p:sp>
+      <p:sp>
+        <p:nvSpPr>
+          <p:cNvPr id="3" name="Content Placeholder 2"/>
+          <p:cNvSpPr>
+            <a:spLocks noGrp="1"/>
+          </p:cNvSpPr>
+          <p:nvPr>
+            <p:ph idx="1"/>
+          </p:nvPr>
+        </p:nvSpPr>
+        <p:spPr/>
+        <p:txBody>
+          <a:bodyPr/>
+          <a:lstStyle/>
+          <a:p>
+            <a:r>
+              <a:rPr lang="en-US" dirty="0" smtClean="0"/>
+              <a:t>What were some vulnerabilities you saw in my site during the demo?</a:t>
+            </a:r>
+          </a:p>
+          <a:p>
+            <a:r>
+              <a:rPr lang="en-US" dirty="0" smtClean="0"/>
+              <a:t>Are OUR sites secure?  Look for vulnerabilities where it matters.</a:t>
+            </a:r>
+            <a:endParaRPr lang="en-US" dirty="0"/>
+          </a:p>
+        </p:txBody>
+      </p:sp>
+    </p:spTree>
+    <p:extLst>
+      <p:ext uri="{BB962C8B-B14F-4D97-AF65-F5344CB8AC3E}">
+        <p14:creationId xmlns:p14="http://schemas.microsoft.com/office/powerpoint/2010/main" val="550167488"/>
+      </p:ext>
+    </p:extLst>
+  </p:cSld>
+  <p:clrMapOvr>
+    <a:masterClrMapping/>
+  </p:clrMapOvr>
+</p:sld>
+</file>
+
+<file path=ppt/slides/slide18.xml><?xml version="1.0" encoding="utf-8"?>
 <p:sld xmlns:a="http://schemas.openxmlformats.org/drawingml/2006/main" xmlns:r="http://schemas.openxmlformats.org/officeDocument/2006/relationships" xmlns:p="http://schemas.openxmlformats.org/presentationml/2006/main">
   <p:cSld>
     <p:spTree>

</xml_diff>